<commit_message>
Provide portal website with Traffic Manager (#2)
</commit_message>
<xml_diff>
--- a/media/schematics.pptx
+++ b/media/schematics.pptx
@@ -25307,8 +25307,8 @@
         </p:nvCxnSpPr>
         <p:spPr>
           <a:xfrm rot="5400000" flipH="1" flipV="1">
-            <a:off x="456159" y="1439927"/>
-            <a:ext cx="1490476" cy="921249"/>
+            <a:off x="540460" y="1524228"/>
+            <a:ext cx="1321874" cy="921249"/>
           </a:xfrm>
           <a:prstGeom prst="bentConnector2">
             <a:avLst/>
@@ -25336,564 +25336,69 @@
           </a:fontRef>
         </p:style>
       </p:cxnSp>
-      <p:grpSp>
-        <p:nvGrpSpPr>
-          <p:cNvPr id="185" name="Group 184">
+      <p:sp>
+        <p:nvSpPr>
+          <p:cNvPr id="36" name="Rectangle 35">
             <a:extLst>
               <a:ext uri="{FF2B5EF4-FFF2-40B4-BE49-F238E27FC236}">
-                <a16:creationId xmlns:a16="http://schemas.microsoft.com/office/drawing/2014/main" id="{BFFBAAC1-7F41-4EC4-B618-CFA7A51B0858}"/>
+                <a16:creationId xmlns:a16="http://schemas.microsoft.com/office/drawing/2014/main" id="{9920AF8D-6C1D-4930-B101-E3BFE5FA51B3}"/>
               </a:ext>
             </a:extLst>
           </p:cNvPr>
-          <p:cNvGrpSpPr/>
+          <p:cNvSpPr/>
           <p:nvPr/>
-        </p:nvGrpSpPr>
-        <p:grpSpPr>
-          <a:xfrm>
-            <a:off x="1662021" y="-25791"/>
-            <a:ext cx="8867956" cy="1989301"/>
-            <a:chOff x="1662021" y="-25791"/>
-            <a:chExt cx="8867956" cy="1989301"/>
-          </a:xfrm>
-        </p:grpSpPr>
-        <p:sp>
-          <p:nvSpPr>
-            <p:cNvPr id="13" name="Rectangle 12">
-              <a:extLst>
-                <a:ext uri="{FF2B5EF4-FFF2-40B4-BE49-F238E27FC236}">
-                  <a16:creationId xmlns:a16="http://schemas.microsoft.com/office/drawing/2014/main" id="{F2A22F9F-1A05-42B7-8524-1A09BE1A5D06}"/>
-                </a:ext>
-              </a:extLst>
-            </p:cNvPr>
-            <p:cNvSpPr/>
-            <p:nvPr/>
-          </p:nvSpPr>
-          <p:spPr>
-            <a:xfrm>
-              <a:off x="1662022" y="347116"/>
-              <a:ext cx="8867955" cy="1616394"/>
-            </a:xfrm>
-            <a:prstGeom prst="rect">
-              <a:avLst/>
-            </a:prstGeom>
-            <a:ln>
-              <a:solidFill>
-                <a:srgbClr val="0070C0"/>
-              </a:solidFill>
-            </a:ln>
-          </p:spPr>
-          <p:style>
-            <a:lnRef idx="2">
-              <a:schemeClr val="accent3"/>
-            </a:lnRef>
-            <a:fillRef idx="1">
-              <a:schemeClr val="lt1"/>
-            </a:fillRef>
-            <a:effectRef idx="0">
-              <a:schemeClr val="accent3"/>
-            </a:effectRef>
-            <a:fontRef idx="minor">
-              <a:schemeClr val="dk1"/>
-            </a:fontRef>
-          </p:style>
-          <p:txBody>
-            <a:bodyPr rtlCol="0" anchor="ctr"/>
-            <a:lstStyle/>
-            <a:p>
-              <a:pPr algn="ctr"/>
-              <a:endParaRPr lang="en-BE" dirty="0" err="1">
-                <a:solidFill>
-                  <a:schemeClr val="bg1"/>
-                </a:solidFill>
-                <a:latin typeface="Tahoma"/>
-                <a:cs typeface="Tahoma"/>
-              </a:endParaRPr>
-            </a:p>
-          </p:txBody>
-        </p:sp>
-        <p:grpSp>
-          <p:nvGrpSpPr>
-            <p:cNvPr id="34" name="Group 33">
-              <a:extLst>
-                <a:ext uri="{FF2B5EF4-FFF2-40B4-BE49-F238E27FC236}">
-                  <a16:creationId xmlns:a16="http://schemas.microsoft.com/office/drawing/2014/main" id="{D8241CF7-0EC4-4317-8597-6B12FF0A0CAA}"/>
-                </a:ext>
-              </a:extLst>
-            </p:cNvPr>
-            <p:cNvGrpSpPr/>
-            <p:nvPr/>
-          </p:nvGrpSpPr>
-          <p:grpSpPr>
-            <a:xfrm>
-              <a:off x="4065242" y="493992"/>
-              <a:ext cx="4061513" cy="631706"/>
-              <a:chOff x="3129055" y="741781"/>
-              <a:chExt cx="4061513" cy="631706"/>
-            </a:xfrm>
-          </p:grpSpPr>
-          <p:pic>
-            <p:nvPicPr>
-              <p:cNvPr id="25" name="Picture 24">
-                <a:extLst>
-                  <a:ext uri="{FF2B5EF4-FFF2-40B4-BE49-F238E27FC236}">
-                    <a16:creationId xmlns:a16="http://schemas.microsoft.com/office/drawing/2014/main" id="{54199215-15FE-4860-8FAD-96063DC0D153}"/>
-                  </a:ext>
-                </a:extLst>
-              </p:cNvPr>
-              <p:cNvPicPr>
-                <a:picLocks noChangeAspect="1"/>
-              </p:cNvPicPr>
-              <p:nvPr/>
-            </p:nvPicPr>
-            <p:blipFill>
-              <a:blip r:embed="rId3"/>
-              <a:stretch>
-                <a:fillRect/>
-              </a:stretch>
-            </p:blipFill>
-            <p:spPr>
-              <a:xfrm>
-                <a:off x="3129055" y="748812"/>
-                <a:ext cx="616163" cy="616163"/>
-              </a:xfrm>
-              <a:prstGeom prst="rect">
-                <a:avLst/>
-              </a:prstGeom>
-            </p:spPr>
-          </p:pic>
-          <p:pic>
-            <p:nvPicPr>
-              <p:cNvPr id="26" name="Picture 25">
-                <a:extLst>
-                  <a:ext uri="{FF2B5EF4-FFF2-40B4-BE49-F238E27FC236}">
-                    <a16:creationId xmlns:a16="http://schemas.microsoft.com/office/drawing/2014/main" id="{A027AF7B-7479-4D09-A7E4-425BD744C380}"/>
-                  </a:ext>
-                </a:extLst>
-              </p:cNvPr>
-              <p:cNvPicPr>
-                <a:picLocks noChangeAspect="1"/>
-              </p:cNvPicPr>
-              <p:nvPr/>
-            </p:nvPicPr>
-            <p:blipFill>
-              <a:blip r:embed="rId3"/>
-              <a:stretch>
-                <a:fillRect/>
-              </a:stretch>
-            </p:blipFill>
-            <p:spPr>
-              <a:xfrm>
-                <a:off x="4107431" y="753522"/>
-                <a:ext cx="616163" cy="616163"/>
-              </a:xfrm>
-              <a:prstGeom prst="rect">
-                <a:avLst/>
-              </a:prstGeom>
-            </p:spPr>
-          </p:pic>
-          <p:pic>
-            <p:nvPicPr>
-              <p:cNvPr id="30" name="Picture 29">
-                <a:extLst>
-                  <a:ext uri="{FF2B5EF4-FFF2-40B4-BE49-F238E27FC236}">
-                    <a16:creationId xmlns:a16="http://schemas.microsoft.com/office/drawing/2014/main" id="{BBD9A6D4-D91D-49D4-BC85-54E3A9F57236}"/>
-                  </a:ext>
-                </a:extLst>
-              </p:cNvPr>
-              <p:cNvPicPr>
-                <a:picLocks noChangeAspect="1"/>
-              </p:cNvPicPr>
-              <p:nvPr/>
-            </p:nvPicPr>
-            <p:blipFill>
-              <a:blip r:embed="rId3"/>
-              <a:stretch>
-                <a:fillRect/>
-              </a:stretch>
-            </p:blipFill>
-            <p:spPr>
-              <a:xfrm>
-                <a:off x="5596029" y="757324"/>
-                <a:ext cx="616163" cy="616163"/>
-              </a:xfrm>
-              <a:prstGeom prst="rect">
-                <a:avLst/>
-              </a:prstGeom>
-            </p:spPr>
-          </p:pic>
-          <p:pic>
-            <p:nvPicPr>
-              <p:cNvPr id="31" name="Picture 30">
-                <a:extLst>
-                  <a:ext uri="{FF2B5EF4-FFF2-40B4-BE49-F238E27FC236}">
-                    <a16:creationId xmlns:a16="http://schemas.microsoft.com/office/drawing/2014/main" id="{32A0AEEB-6624-4C9C-BA6F-8EB1B5F0F429}"/>
-                  </a:ext>
-                </a:extLst>
-              </p:cNvPr>
-              <p:cNvPicPr>
-                <a:picLocks noChangeAspect="1"/>
-              </p:cNvPicPr>
-              <p:nvPr/>
-            </p:nvPicPr>
-            <p:blipFill>
-              <a:blip r:embed="rId3"/>
-              <a:stretch>
-                <a:fillRect/>
-              </a:stretch>
-            </p:blipFill>
-            <p:spPr>
-              <a:xfrm>
-                <a:off x="6574405" y="757323"/>
-                <a:ext cx="616163" cy="616163"/>
-              </a:xfrm>
-              <a:prstGeom prst="rect">
-                <a:avLst/>
-              </a:prstGeom>
-            </p:spPr>
-          </p:pic>
-          <p:sp>
-            <p:nvSpPr>
-              <p:cNvPr id="32" name="Rectangle 31">
-                <a:extLst>
-                  <a:ext uri="{FF2B5EF4-FFF2-40B4-BE49-F238E27FC236}">
-                    <a16:creationId xmlns:a16="http://schemas.microsoft.com/office/drawing/2014/main" id="{0CFAEC96-5AB4-4AD6-BFC5-C35013244E84}"/>
-                  </a:ext>
-                </a:extLst>
-              </p:cNvPr>
-              <p:cNvSpPr/>
-              <p:nvPr/>
-            </p:nvSpPr>
-            <p:spPr>
-              <a:xfrm rot="5400000">
-                <a:off x="4851731" y="613643"/>
-                <a:ext cx="616162" cy="872437"/>
-              </a:xfrm>
-              <a:prstGeom prst="rect">
-                <a:avLst/>
-              </a:prstGeom>
-              <a:noFill/>
-              <a:ln w="19050">
-                <a:noFill/>
-              </a:ln>
-            </p:spPr>
-            <p:style>
-              <a:lnRef idx="2">
-                <a:schemeClr val="accent2"/>
-              </a:lnRef>
-              <a:fillRef idx="1">
-                <a:schemeClr val="lt1"/>
-              </a:fillRef>
-              <a:effectRef idx="0">
-                <a:schemeClr val="accent2"/>
-              </a:effectRef>
-              <a:fontRef idx="minor">
-                <a:schemeClr val="dk1"/>
-              </a:fontRef>
-            </p:style>
-            <p:txBody>
-              <a:bodyPr vert="vert270" rtlCol="0" anchor="ctr"/>
-              <a:lstStyle/>
-              <a:p>
-                <a:pPr algn="ctr"/>
-                <a:r>
-                  <a:rPr lang="en-US" sz="1200" dirty="0">
-                    <a:solidFill>
-                      <a:srgbClr val="080808"/>
-                    </a:solidFill>
-                    <a:latin typeface="Segoe UI (Body)"/>
-                    <a:cs typeface="Tahoma"/>
-                  </a:rPr>
-                  <a:t>……..</a:t>
-                </a:r>
-                <a:endParaRPr lang="en-BE" sz="1200" dirty="0" err="1">
-                  <a:solidFill>
-                    <a:srgbClr val="080808"/>
-                  </a:solidFill>
-                  <a:latin typeface="Segoe UI (Body)"/>
-                  <a:cs typeface="Tahoma"/>
-                </a:endParaRPr>
-              </a:p>
-            </p:txBody>
-          </p:sp>
-        </p:grpSp>
-        <p:sp>
-          <p:nvSpPr>
-            <p:cNvPr id="36" name="Rectangle 35">
-              <a:extLst>
-                <a:ext uri="{FF2B5EF4-FFF2-40B4-BE49-F238E27FC236}">
-                  <a16:creationId xmlns:a16="http://schemas.microsoft.com/office/drawing/2014/main" id="{9920AF8D-6C1D-4930-B101-E3BFE5FA51B3}"/>
-                </a:ext>
-              </a:extLst>
-            </p:cNvPr>
-            <p:cNvSpPr/>
-            <p:nvPr/>
-          </p:nvSpPr>
-          <p:spPr>
-            <a:xfrm rot="5400000">
-              <a:off x="5909545" y="-4273315"/>
-              <a:ext cx="372907" cy="8867955"/>
-            </a:xfrm>
-            <a:prstGeom prst="rect">
-              <a:avLst/>
-            </a:prstGeom>
+        </p:nvSpPr>
+        <p:spPr>
+          <a:xfrm rot="5400000">
+            <a:off x="5909545" y="-4273315"/>
+            <a:ext cx="372907" cy="8867955"/>
+          </a:xfrm>
+          <a:prstGeom prst="rect">
+            <a:avLst/>
+          </a:prstGeom>
+          <a:noFill/>
+          <a:ln w="19050">
             <a:noFill/>
-            <a:ln w="19050">
-              <a:noFill/>
-            </a:ln>
-          </p:spPr>
-          <p:style>
-            <a:lnRef idx="2">
-              <a:schemeClr val="accent2"/>
-            </a:lnRef>
-            <a:fillRef idx="1">
-              <a:schemeClr val="lt1"/>
-            </a:fillRef>
-            <a:effectRef idx="0">
-              <a:schemeClr val="accent2"/>
-            </a:effectRef>
-            <a:fontRef idx="minor">
-              <a:schemeClr val="dk1"/>
-            </a:fontRef>
-          </p:style>
-          <p:txBody>
-            <a:bodyPr vert="vert270" rtlCol="0" anchor="ctr"/>
-            <a:lstStyle/>
-            <a:p>
-              <a:r>
-                <a:rPr lang="en-US" sz="1400" b="1" dirty="0">
-                  <a:solidFill>
-                    <a:srgbClr val="0070C0"/>
-                  </a:solidFill>
-                  <a:latin typeface="Segoe UI (Body)"/>
-                  <a:cs typeface="Tahoma"/>
-                </a:rPr>
-                <a:t>Application Resource Group</a:t>
-              </a:r>
-              <a:endParaRPr lang="en-BE" sz="1400" b="1" dirty="0" err="1">
+          </a:ln>
+        </p:spPr>
+        <p:style>
+          <a:lnRef idx="2">
+            <a:schemeClr val="accent2"/>
+          </a:lnRef>
+          <a:fillRef idx="1">
+            <a:schemeClr val="lt1"/>
+          </a:fillRef>
+          <a:effectRef idx="0">
+            <a:schemeClr val="accent2"/>
+          </a:effectRef>
+          <a:fontRef idx="minor">
+            <a:schemeClr val="dk1"/>
+          </a:fontRef>
+        </p:style>
+        <p:txBody>
+          <a:bodyPr vert="vert270" rtlCol="0" anchor="ctr"/>
+          <a:lstStyle/>
+          <a:p>
+            <a:r>
+              <a:rPr lang="en-US" sz="1400" b="1" dirty="0">
                 <a:solidFill>
                   <a:srgbClr val="0070C0"/>
                 </a:solidFill>
                 <a:latin typeface="Segoe UI (Body)"/>
                 <a:cs typeface="Tahoma"/>
-              </a:endParaRPr>
-            </a:p>
-          </p:txBody>
-        </p:sp>
-        <p:pic>
-          <p:nvPicPr>
-            <p:cNvPr id="136" name="Picture 135">
-              <a:extLst>
-                <a:ext uri="{FF2B5EF4-FFF2-40B4-BE49-F238E27FC236}">
-                  <a16:creationId xmlns:a16="http://schemas.microsoft.com/office/drawing/2014/main" id="{5F019165-5A39-4462-9F4B-DAB7F66A4CFD}"/>
-                </a:ext>
-              </a:extLst>
-            </p:cNvPr>
-            <p:cNvPicPr>
-              <a:picLocks noChangeAspect="1"/>
-            </p:cNvPicPr>
-            <p:nvPr/>
-          </p:nvPicPr>
-          <p:blipFill>
-            <a:blip r:embed="rId4"/>
-            <a:stretch>
-              <a:fillRect/>
-            </a:stretch>
-          </p:blipFill>
-          <p:spPr>
-            <a:xfrm>
-              <a:off x="5872663" y="1316598"/>
-              <a:ext cx="446663" cy="446663"/>
-            </a:xfrm>
-            <a:prstGeom prst="rect">
-              <a:avLst/>
-            </a:prstGeom>
-          </p:spPr>
-        </p:pic>
-        <p:cxnSp>
-          <p:nvCxnSpPr>
-            <p:cNvPr id="145" name="Connector: Elbow 144">
-              <a:extLst>
-                <a:ext uri="{FF2B5EF4-FFF2-40B4-BE49-F238E27FC236}">
-                  <a16:creationId xmlns:a16="http://schemas.microsoft.com/office/drawing/2014/main" id="{61AEB452-4A01-49DE-AFFC-9B3E5E146698}"/>
-                </a:ext>
-              </a:extLst>
-            </p:cNvPr>
-            <p:cNvCxnSpPr>
-              <a:cxnSpLocks/>
-              <a:stCxn id="26" idx="2"/>
-            </p:cNvCxnSpPr>
-            <p:nvPr/>
-          </p:nvCxnSpPr>
-          <p:spPr>
-            <a:xfrm rot="16200000" flipH="1">
-              <a:off x="5428740" y="1044855"/>
-              <a:ext cx="342573" cy="496653"/>
-            </a:xfrm>
-            <a:prstGeom prst="bentConnector2">
-              <a:avLst/>
-            </a:prstGeom>
-            <a:ln w="19050">
+              </a:rPr>
+              <a:t>Application Resource Group</a:t>
+            </a:r>
+            <a:endParaRPr lang="en-BE" sz="1400" b="1" dirty="0" err="1">
               <a:solidFill>
-                <a:schemeClr val="accent1"/>
+                <a:srgbClr val="0070C0"/>
               </a:solidFill>
-              <a:prstDash val="sysDot"/>
-              <a:tailEnd type="triangle"/>
-            </a:ln>
-          </p:spPr>
-          <p:style>
-            <a:lnRef idx="1">
-              <a:schemeClr val="accent3"/>
-            </a:lnRef>
-            <a:fillRef idx="0">
-              <a:schemeClr val="accent3"/>
-            </a:fillRef>
-            <a:effectRef idx="0">
-              <a:schemeClr val="accent3"/>
-            </a:effectRef>
-            <a:fontRef idx="minor">
-              <a:schemeClr val="tx1"/>
-            </a:fontRef>
-          </p:style>
-        </p:cxnSp>
-        <p:cxnSp>
-          <p:nvCxnSpPr>
-            <p:cNvPr id="150" name="Connector: Elbow 149">
-              <a:extLst>
-                <a:ext uri="{FF2B5EF4-FFF2-40B4-BE49-F238E27FC236}">
-                  <a16:creationId xmlns:a16="http://schemas.microsoft.com/office/drawing/2014/main" id="{4294EB57-D253-43C9-8C3C-454DBD6C3372}"/>
-                </a:ext>
-              </a:extLst>
-            </p:cNvPr>
-            <p:cNvCxnSpPr>
-              <a:cxnSpLocks/>
-              <a:stCxn id="25" idx="2"/>
-            </p:cNvCxnSpPr>
-            <p:nvPr/>
-          </p:nvCxnSpPr>
-          <p:spPr>
-            <a:xfrm rot="16200000" flipH="1">
-              <a:off x="4854783" y="635726"/>
-              <a:ext cx="512110" cy="1475029"/>
-            </a:xfrm>
-            <a:prstGeom prst="bentConnector2">
-              <a:avLst/>
-            </a:prstGeom>
-            <a:ln w="19050">
-              <a:solidFill>
-                <a:schemeClr val="accent1"/>
-              </a:solidFill>
-              <a:prstDash val="sysDot"/>
-              <a:tailEnd type="triangle"/>
-            </a:ln>
-          </p:spPr>
-          <p:style>
-            <a:lnRef idx="1">
-              <a:schemeClr val="accent3"/>
-            </a:lnRef>
-            <a:fillRef idx="0">
-              <a:schemeClr val="accent3"/>
-            </a:fillRef>
-            <a:effectRef idx="0">
-              <a:schemeClr val="accent3"/>
-            </a:effectRef>
-            <a:fontRef idx="minor">
-              <a:schemeClr val="tx1"/>
-            </a:fontRef>
-          </p:style>
-        </p:cxnSp>
-        <p:cxnSp>
-          <p:nvCxnSpPr>
-            <p:cNvPr id="153" name="Connector: Elbow 152">
-              <a:extLst>
-                <a:ext uri="{FF2B5EF4-FFF2-40B4-BE49-F238E27FC236}">
-                  <a16:creationId xmlns:a16="http://schemas.microsoft.com/office/drawing/2014/main" id="{44A029BF-F4D3-489C-9C28-36A7E7C69A53}"/>
-                </a:ext>
-              </a:extLst>
-            </p:cNvPr>
-            <p:cNvCxnSpPr>
-              <a:cxnSpLocks/>
-              <a:stCxn id="31" idx="2"/>
-            </p:cNvCxnSpPr>
-            <p:nvPr/>
-          </p:nvCxnSpPr>
-          <p:spPr>
-            <a:xfrm rot="5400000">
-              <a:off x="6829361" y="639982"/>
-              <a:ext cx="503599" cy="1475029"/>
-            </a:xfrm>
-            <a:prstGeom prst="bentConnector2">
-              <a:avLst/>
-            </a:prstGeom>
-            <a:ln w="19050">
-              <a:solidFill>
-                <a:schemeClr val="accent1"/>
-              </a:solidFill>
-              <a:prstDash val="sysDot"/>
-              <a:tailEnd type="triangle"/>
-            </a:ln>
-          </p:spPr>
-          <p:style>
-            <a:lnRef idx="1">
-              <a:schemeClr val="accent3"/>
-            </a:lnRef>
-            <a:fillRef idx="0">
-              <a:schemeClr val="accent3"/>
-            </a:fillRef>
-            <a:effectRef idx="0">
-              <a:schemeClr val="accent3"/>
-            </a:effectRef>
-            <a:fontRef idx="minor">
-              <a:schemeClr val="tx1"/>
-            </a:fontRef>
-          </p:style>
-        </p:cxnSp>
-        <p:cxnSp>
-          <p:nvCxnSpPr>
-            <p:cNvPr id="159" name="Connector: Elbow 158">
-              <a:extLst>
-                <a:ext uri="{FF2B5EF4-FFF2-40B4-BE49-F238E27FC236}">
-                  <a16:creationId xmlns:a16="http://schemas.microsoft.com/office/drawing/2014/main" id="{BE73164F-0C2D-4A0C-971C-F9AC4C4DD39C}"/>
-                </a:ext>
-              </a:extLst>
-            </p:cNvPr>
-            <p:cNvCxnSpPr>
-              <a:cxnSpLocks/>
-              <a:stCxn id="30" idx="2"/>
-            </p:cNvCxnSpPr>
-            <p:nvPr/>
-          </p:nvCxnSpPr>
-          <p:spPr>
-            <a:xfrm rot="5400000">
-              <a:off x="6431287" y="1038057"/>
-              <a:ext cx="321370" cy="496652"/>
-            </a:xfrm>
-            <a:prstGeom prst="bentConnector2">
-              <a:avLst/>
-            </a:prstGeom>
-            <a:ln w="19050">
-              <a:solidFill>
-                <a:schemeClr val="accent1"/>
-              </a:solidFill>
-              <a:prstDash val="sysDot"/>
-              <a:tailEnd type="triangle"/>
-            </a:ln>
-          </p:spPr>
-          <p:style>
-            <a:lnRef idx="1">
-              <a:schemeClr val="accent3"/>
-            </a:lnRef>
-            <a:fillRef idx="0">
-              <a:schemeClr val="accent3"/>
-            </a:fillRef>
-            <a:effectRef idx="0">
-              <a:schemeClr val="accent3"/>
-            </a:effectRef>
-            <a:fontRef idx="minor">
-              <a:schemeClr val="tx1"/>
-            </a:fontRef>
-          </p:style>
-        </p:cxnSp>
-      </p:grpSp>
+              <a:latin typeface="Segoe UI (Body)"/>
+              <a:cs typeface="Tahoma"/>
+            </a:endParaRPr>
+          </a:p>
+        </p:txBody>
+      </p:sp>
       <p:grpSp>
         <p:nvGrpSpPr>
           <p:cNvPr id="184" name="Group 183">
@@ -25908,7 +25413,7 @@
         </p:nvGrpSpPr>
         <p:grpSpPr>
           <a:xfrm>
-            <a:off x="1662022" y="2048901"/>
+            <a:off x="1662022" y="2381520"/>
             <a:ext cx="8873840" cy="1283113"/>
             <a:chOff x="1662022" y="2048901"/>
             <a:chExt cx="8873840" cy="1283113"/>
@@ -25984,7 +25489,7 @@
             <p:nvPr/>
           </p:nvPicPr>
           <p:blipFill>
-            <a:blip r:embed="rId5"/>
+            <a:blip r:embed="rId3"/>
             <a:stretch>
               <a:fillRect/>
             </a:stretch>
@@ -26097,13 +25602,13 @@
               <p:nvPr/>
             </p:nvPicPr>
             <p:blipFill>
-              <a:blip r:embed="rId6">
+              <a:blip r:embed="rId4">
                 <a:extLst>
                   <a:ext uri="{28A0092B-C50C-407E-A947-70E740481C1C}">
                     <a14:useLocalDpi xmlns:a14="http://schemas.microsoft.com/office/drawing/2010/main" val="0"/>
                   </a:ext>
                   <a:ext uri="{96DAC541-7B7A-43D3-8B79-37D633B846F1}">
-                    <asvg:svgBlip xmlns:asvg="http://schemas.microsoft.com/office/drawing/2016/SVG/main" r:embed="rId7"/>
+                    <asvg:svgBlip xmlns:asvg="http://schemas.microsoft.com/office/drawing/2016/SVG/main" r:embed="rId5"/>
                   </a:ext>
                 </a:extLst>
               </a:blip>
@@ -26232,13 +25737,13 @@
               <p:nvPr/>
             </p:nvPicPr>
             <p:blipFill>
-              <a:blip r:embed="rId6">
+              <a:blip r:embed="rId4">
                 <a:extLst>
                   <a:ext uri="{28A0092B-C50C-407E-A947-70E740481C1C}">
                     <a14:useLocalDpi xmlns:a14="http://schemas.microsoft.com/office/drawing/2010/main" val="0"/>
                   </a:ext>
                   <a:ext uri="{96DAC541-7B7A-43D3-8B79-37D633B846F1}">
-                    <asvg:svgBlip xmlns:asvg="http://schemas.microsoft.com/office/drawing/2016/SVG/main" r:embed="rId7"/>
+                    <asvg:svgBlip xmlns:asvg="http://schemas.microsoft.com/office/drawing/2016/SVG/main" r:embed="rId5"/>
                   </a:ext>
                 </a:extLst>
               </a:blip>
@@ -26337,10 +25842,10 @@
       </p:grpSp>
       <p:grpSp>
         <p:nvGrpSpPr>
-          <p:cNvPr id="189" name="Group 188">
+          <p:cNvPr id="6" name="Group 5">
             <a:extLst>
               <a:ext uri="{FF2B5EF4-FFF2-40B4-BE49-F238E27FC236}">
-                <a16:creationId xmlns:a16="http://schemas.microsoft.com/office/drawing/2014/main" id="{F6895235-0CBD-4877-AAB8-7DCBD0EAF6DF}"/>
+                <a16:creationId xmlns:a16="http://schemas.microsoft.com/office/drawing/2014/main" id="{90B3181F-8FE4-47CB-BC67-8FC436CF2500}"/>
               </a:ext>
             </a:extLst>
           </p:cNvPr>
@@ -26349,10 +25854,10 @@
         </p:nvGrpSpPr>
         <p:grpSpPr>
           <a:xfrm>
-            <a:off x="1662017" y="3496314"/>
-            <a:ext cx="8867960" cy="3300725"/>
+            <a:off x="1662017" y="3820466"/>
+            <a:ext cx="8867960" cy="2867695"/>
             <a:chOff x="1662017" y="3496314"/>
-            <a:chExt cx="8867960" cy="3300725"/>
+            <a:chExt cx="8867960" cy="2867695"/>
           </a:xfrm>
         </p:grpSpPr>
         <p:sp>
@@ -26370,7 +25875,7 @@
           <p:spPr>
             <a:xfrm>
               <a:off x="1662022" y="3869222"/>
-              <a:ext cx="8867955" cy="2927817"/>
+              <a:ext cx="8867955" cy="2494787"/>
             </a:xfrm>
             <a:prstGeom prst="rect">
               <a:avLst/>
@@ -26445,7 +25950,7 @@
               <p:nvPr/>
             </p:nvPicPr>
             <p:blipFill>
-              <a:blip r:embed="rId8"/>
+              <a:blip r:embed="rId6"/>
               <a:stretch>
                 <a:fillRect/>
               </a:stretch>
@@ -26560,7 +26065,7 @@
               <p:nvPr/>
             </p:nvPicPr>
             <p:blipFill>
-              <a:blip r:embed="rId8"/>
+              <a:blip r:embed="rId6"/>
               <a:stretch>
                 <a:fillRect/>
               </a:stretch>
@@ -26718,14 +26223,14 @@
             <p:nvPr/>
           </p:nvPicPr>
           <p:blipFill>
-            <a:blip r:embed="rId9"/>
+            <a:blip r:embed="rId7"/>
             <a:stretch>
               <a:fillRect/>
             </a:stretch>
           </p:blipFill>
           <p:spPr>
             <a:xfrm>
-              <a:off x="5814684" y="5650772"/>
+              <a:off x="5814684" y="5279353"/>
               <a:ext cx="562622" cy="560248"/>
             </a:xfrm>
             <a:prstGeom prst="rect">
@@ -26747,7 +26252,7 @@
           </p:nvSpPr>
           <p:spPr>
             <a:xfrm rot="5400000">
-              <a:off x="5877194" y="5615384"/>
+              <a:off x="5877194" y="5243965"/>
               <a:ext cx="437602" cy="1546662"/>
             </a:xfrm>
             <a:prstGeom prst="rect">
@@ -26815,7 +26320,7 @@
           <p:spPr>
             <a:xfrm>
               <a:off x="5428144" y="4457222"/>
-              <a:ext cx="589275" cy="1169673"/>
+              <a:ext cx="585665" cy="780331"/>
             </a:xfrm>
             <a:prstGeom prst="bentConnector2">
               <a:avLst/>
@@ -26860,8 +26365,8 @@
           </p:nvCxnSpPr>
           <p:spPr>
             <a:xfrm rot="10800000" flipV="1">
-              <a:off x="6220203" y="4457222"/>
-              <a:ext cx="682018" cy="1169672"/>
+              <a:off x="6244257" y="4457221"/>
+              <a:ext cx="657964" cy="780331"/>
             </a:xfrm>
             <a:prstGeom prst="bentConnector2">
               <a:avLst/>
@@ -26924,7 +26429,7 @@
               <p:nvPr/>
             </p:nvPicPr>
             <p:blipFill>
-              <a:blip r:embed="rId8"/>
+              <a:blip r:embed="rId6"/>
               <a:stretch>
                 <a:fillRect/>
               </a:stretch>
@@ -26979,7 +26484,7 @@
               </a:fontRef>
             </p:style>
             <p:txBody>
-              <a:bodyPr vert="vert270" rtlCol="0" anchor="ctr"/>
+              <a:bodyPr vert="vert270" rtlCol="0" anchor="t"/>
               <a:lstStyle/>
               <a:p>
                 <a:pPr algn="ctr"/>
@@ -27039,7 +26544,7 @@
               <p:nvPr/>
             </p:nvPicPr>
             <p:blipFill>
-              <a:blip r:embed="rId8"/>
+              <a:blip r:embed="rId6"/>
               <a:stretch>
                 <a:fillRect/>
               </a:stretch>
@@ -27094,7 +26599,7 @@
               </a:fontRef>
             </p:style>
             <p:txBody>
-              <a:bodyPr vert="vert270" rtlCol="0" anchor="ctr"/>
+              <a:bodyPr vert="vert270" rtlCol="0" anchor="t"/>
               <a:lstStyle/>
               <a:p>
                 <a:pPr algn="ctr"/>
@@ -27227,14 +26732,14 @@
             <p:nvPr/>
           </p:nvPicPr>
           <p:blipFill>
-            <a:blip r:embed="rId10"/>
+            <a:blip r:embed="rId8"/>
             <a:stretch>
               <a:fillRect/>
             </a:stretch>
           </p:blipFill>
           <p:spPr>
             <a:xfrm>
-              <a:off x="2763228" y="5703664"/>
+              <a:off x="2763228" y="5332245"/>
               <a:ext cx="583908" cy="497676"/>
             </a:xfrm>
             <a:prstGeom prst="rect">
@@ -27256,7 +26761,7 @@
           </p:nvSpPr>
           <p:spPr>
             <a:xfrm rot="5400000">
-              <a:off x="2836381" y="5530982"/>
+              <a:off x="2836381" y="5159563"/>
               <a:ext cx="437602" cy="1814968"/>
             </a:xfrm>
             <a:prstGeom prst="rect">
@@ -27344,8 +26849,8 @@
         </p:nvCxnSpPr>
         <p:spPr>
           <a:xfrm rot="5400000">
-            <a:off x="5100803" y="1677453"/>
-            <a:ext cx="909385" cy="1081001"/>
+            <a:off x="5154258" y="2063527"/>
+            <a:ext cx="802475" cy="1081001"/>
           </a:xfrm>
           <a:prstGeom prst="bentConnector3">
             <a:avLst>
@@ -27393,8 +26898,8 @@
         </p:nvCxnSpPr>
         <p:spPr>
           <a:xfrm rot="16200000" flipH="1">
-            <a:off x="6258529" y="1600727"/>
-            <a:ext cx="894308" cy="1219376"/>
+            <a:off x="6311984" y="1986801"/>
+            <a:ext cx="787398" cy="1219376"/>
           </a:xfrm>
           <a:prstGeom prst="bentConnector3">
             <a:avLst>
@@ -27442,8 +26947,8 @@
         </p:nvCxnSpPr>
         <p:spPr>
           <a:xfrm>
-            <a:off x="7315371" y="3096253"/>
-            <a:ext cx="0" cy="1038422"/>
+            <a:off x="7315371" y="3428872"/>
+            <a:ext cx="0" cy="1029955"/>
           </a:xfrm>
           <a:prstGeom prst="straightConnector1">
             <a:avLst/>
@@ -27489,8 +26994,8 @@
         </p:nvCxnSpPr>
         <p:spPr>
           <a:xfrm>
-            <a:off x="5014994" y="3111330"/>
-            <a:ext cx="0" cy="1023345"/>
+            <a:off x="5014994" y="3443949"/>
+            <a:ext cx="0" cy="1014878"/>
           </a:xfrm>
           <a:prstGeom prst="straightConnector1">
             <a:avLst/>
@@ -27536,12 +27041,12 @@
         </p:nvCxnSpPr>
         <p:spPr>
           <a:xfrm flipV="1">
-            <a:off x="9691103" y="1155313"/>
-            <a:ext cx="838874" cy="3301909"/>
+            <a:off x="9691103" y="1323915"/>
+            <a:ext cx="838874" cy="3457459"/>
           </a:xfrm>
           <a:prstGeom prst="bentConnector3">
             <a:avLst>
-              <a:gd name="adj1" fmla="val 197178"/>
+              <a:gd name="adj1" fmla="val 144283"/>
             </a:avLst>
           </a:prstGeom>
           <a:ln w="19050">
@@ -27586,7 +27091,7 @@
         <p:spPr>
           <a:xfrm rot="10800000">
             <a:off x="773248" y="3482080"/>
-            <a:ext cx="1868784" cy="975142"/>
+            <a:ext cx="1868784" cy="1299294"/>
           </a:xfrm>
           <a:prstGeom prst="bentConnector2">
             <a:avLst/>
@@ -27631,7 +27136,7 @@
         </p:nvCxnSpPr>
         <p:spPr>
           <a:xfrm rot="16200000" flipH="1">
-            <a:off x="476538" y="3665811"/>
+            <a:off x="476538" y="3618544"/>
             <a:ext cx="2461773" cy="2111608"/>
           </a:xfrm>
           <a:prstGeom prst="bentConnector2">
@@ -27719,6 +27224,1014 @@
                 <a:srgbClr val="080808"/>
               </a:solidFill>
               <a:latin typeface="Segoe UI (Body)"/>
+              <a:cs typeface="Tahoma"/>
+            </a:endParaRPr>
+          </a:p>
+        </p:txBody>
+      </p:sp>
+      <p:grpSp>
+        <p:nvGrpSpPr>
+          <p:cNvPr id="33" name="Group 32">
+            <a:extLst>
+              <a:ext uri="{FF2B5EF4-FFF2-40B4-BE49-F238E27FC236}">
+                <a16:creationId xmlns:a16="http://schemas.microsoft.com/office/drawing/2014/main" id="{6C6E3BC0-4B1F-4F6C-AC68-75592248D943}"/>
+              </a:ext>
+            </a:extLst>
+          </p:cNvPr>
+          <p:cNvGrpSpPr/>
+          <p:nvPr/>
+        </p:nvGrpSpPr>
+        <p:grpSpPr>
+          <a:xfrm>
+            <a:off x="1662022" y="347115"/>
+            <a:ext cx="8867955" cy="1953599"/>
+            <a:chOff x="1662022" y="347115"/>
+            <a:chExt cx="8867955" cy="1953599"/>
+          </a:xfrm>
+        </p:grpSpPr>
+        <p:sp>
+          <p:nvSpPr>
+            <p:cNvPr id="13" name="Rectangle 12">
+              <a:extLst>
+                <a:ext uri="{FF2B5EF4-FFF2-40B4-BE49-F238E27FC236}">
+                  <a16:creationId xmlns:a16="http://schemas.microsoft.com/office/drawing/2014/main" id="{F2A22F9F-1A05-42B7-8524-1A09BE1A5D06}"/>
+                </a:ext>
+              </a:extLst>
+            </p:cNvPr>
+            <p:cNvSpPr/>
+            <p:nvPr/>
+          </p:nvSpPr>
+          <p:spPr>
+            <a:xfrm>
+              <a:off x="1662022" y="347115"/>
+              <a:ext cx="8867955" cy="1953599"/>
+            </a:xfrm>
+            <a:prstGeom prst="rect">
+              <a:avLst/>
+            </a:prstGeom>
+            <a:ln>
+              <a:solidFill>
+                <a:srgbClr val="0070C0"/>
+              </a:solidFill>
+            </a:ln>
+          </p:spPr>
+          <p:style>
+            <a:lnRef idx="2">
+              <a:schemeClr val="accent3"/>
+            </a:lnRef>
+            <a:fillRef idx="1">
+              <a:schemeClr val="lt1"/>
+            </a:fillRef>
+            <a:effectRef idx="0">
+              <a:schemeClr val="accent3"/>
+            </a:effectRef>
+            <a:fontRef idx="minor">
+              <a:schemeClr val="dk1"/>
+            </a:fontRef>
+          </p:style>
+          <p:txBody>
+            <a:bodyPr rtlCol="0" anchor="ctr"/>
+            <a:lstStyle/>
+            <a:p>
+              <a:pPr algn="ctr"/>
+              <a:endParaRPr lang="en-BE" dirty="0" err="1">
+                <a:solidFill>
+                  <a:schemeClr val="bg1"/>
+                </a:solidFill>
+                <a:latin typeface="Tahoma"/>
+                <a:cs typeface="Tahoma"/>
+              </a:endParaRPr>
+            </a:p>
+          </p:txBody>
+        </p:sp>
+        <p:grpSp>
+          <p:nvGrpSpPr>
+            <p:cNvPr id="34" name="Group 33">
+              <a:extLst>
+                <a:ext uri="{FF2B5EF4-FFF2-40B4-BE49-F238E27FC236}">
+                  <a16:creationId xmlns:a16="http://schemas.microsoft.com/office/drawing/2014/main" id="{D8241CF7-0EC4-4317-8597-6B12FF0A0CAA}"/>
+                </a:ext>
+              </a:extLst>
+            </p:cNvPr>
+            <p:cNvGrpSpPr/>
+            <p:nvPr/>
+          </p:nvGrpSpPr>
+          <p:grpSpPr>
+            <a:xfrm>
+              <a:off x="4065242" y="933521"/>
+              <a:ext cx="4061513" cy="631706"/>
+              <a:chOff x="3129055" y="741781"/>
+              <a:chExt cx="4061513" cy="631706"/>
+            </a:xfrm>
+          </p:grpSpPr>
+          <p:pic>
+            <p:nvPicPr>
+              <p:cNvPr id="25" name="Picture 24">
+                <a:extLst>
+                  <a:ext uri="{FF2B5EF4-FFF2-40B4-BE49-F238E27FC236}">
+                    <a16:creationId xmlns:a16="http://schemas.microsoft.com/office/drawing/2014/main" id="{54199215-15FE-4860-8FAD-96063DC0D153}"/>
+                  </a:ext>
+                </a:extLst>
+              </p:cNvPr>
+              <p:cNvPicPr>
+                <a:picLocks noChangeAspect="1"/>
+              </p:cNvPicPr>
+              <p:nvPr/>
+            </p:nvPicPr>
+            <p:blipFill>
+              <a:blip r:embed="rId9"/>
+              <a:stretch>
+                <a:fillRect/>
+              </a:stretch>
+            </p:blipFill>
+            <p:spPr>
+              <a:xfrm>
+                <a:off x="3129055" y="748812"/>
+                <a:ext cx="616163" cy="616163"/>
+              </a:xfrm>
+              <a:prstGeom prst="rect">
+                <a:avLst/>
+              </a:prstGeom>
+            </p:spPr>
+          </p:pic>
+          <p:pic>
+            <p:nvPicPr>
+              <p:cNvPr id="26" name="Picture 25">
+                <a:extLst>
+                  <a:ext uri="{FF2B5EF4-FFF2-40B4-BE49-F238E27FC236}">
+                    <a16:creationId xmlns:a16="http://schemas.microsoft.com/office/drawing/2014/main" id="{A027AF7B-7479-4D09-A7E4-425BD744C380}"/>
+                  </a:ext>
+                </a:extLst>
+              </p:cNvPr>
+              <p:cNvPicPr>
+                <a:picLocks noChangeAspect="1"/>
+              </p:cNvPicPr>
+              <p:nvPr/>
+            </p:nvPicPr>
+            <p:blipFill>
+              <a:blip r:embed="rId9"/>
+              <a:stretch>
+                <a:fillRect/>
+              </a:stretch>
+            </p:blipFill>
+            <p:spPr>
+              <a:xfrm>
+                <a:off x="4107431" y="753522"/>
+                <a:ext cx="616163" cy="616163"/>
+              </a:xfrm>
+              <a:prstGeom prst="rect">
+                <a:avLst/>
+              </a:prstGeom>
+            </p:spPr>
+          </p:pic>
+          <p:pic>
+            <p:nvPicPr>
+              <p:cNvPr id="30" name="Picture 29">
+                <a:extLst>
+                  <a:ext uri="{FF2B5EF4-FFF2-40B4-BE49-F238E27FC236}">
+                    <a16:creationId xmlns:a16="http://schemas.microsoft.com/office/drawing/2014/main" id="{BBD9A6D4-D91D-49D4-BC85-54E3A9F57236}"/>
+                  </a:ext>
+                </a:extLst>
+              </p:cNvPr>
+              <p:cNvPicPr>
+                <a:picLocks noChangeAspect="1"/>
+              </p:cNvPicPr>
+              <p:nvPr/>
+            </p:nvPicPr>
+            <p:blipFill>
+              <a:blip r:embed="rId9"/>
+              <a:stretch>
+                <a:fillRect/>
+              </a:stretch>
+            </p:blipFill>
+            <p:spPr>
+              <a:xfrm>
+                <a:off x="5596029" y="757324"/>
+                <a:ext cx="616163" cy="616163"/>
+              </a:xfrm>
+              <a:prstGeom prst="rect">
+                <a:avLst/>
+              </a:prstGeom>
+            </p:spPr>
+          </p:pic>
+          <p:pic>
+            <p:nvPicPr>
+              <p:cNvPr id="31" name="Picture 30">
+                <a:extLst>
+                  <a:ext uri="{FF2B5EF4-FFF2-40B4-BE49-F238E27FC236}">
+                    <a16:creationId xmlns:a16="http://schemas.microsoft.com/office/drawing/2014/main" id="{32A0AEEB-6624-4C9C-BA6F-8EB1B5F0F429}"/>
+                  </a:ext>
+                </a:extLst>
+              </p:cNvPr>
+              <p:cNvPicPr>
+                <a:picLocks noChangeAspect="1"/>
+              </p:cNvPicPr>
+              <p:nvPr/>
+            </p:nvPicPr>
+            <p:blipFill>
+              <a:blip r:embed="rId9"/>
+              <a:stretch>
+                <a:fillRect/>
+              </a:stretch>
+            </p:blipFill>
+            <p:spPr>
+              <a:xfrm>
+                <a:off x="6574405" y="757323"/>
+                <a:ext cx="616163" cy="616163"/>
+              </a:xfrm>
+              <a:prstGeom prst="rect">
+                <a:avLst/>
+              </a:prstGeom>
+            </p:spPr>
+          </p:pic>
+          <p:sp>
+            <p:nvSpPr>
+              <p:cNvPr id="32" name="Rectangle 31">
+                <a:extLst>
+                  <a:ext uri="{FF2B5EF4-FFF2-40B4-BE49-F238E27FC236}">
+                    <a16:creationId xmlns:a16="http://schemas.microsoft.com/office/drawing/2014/main" id="{0CFAEC96-5AB4-4AD6-BFC5-C35013244E84}"/>
+                  </a:ext>
+                </a:extLst>
+              </p:cNvPr>
+              <p:cNvSpPr/>
+              <p:nvPr/>
+            </p:nvSpPr>
+            <p:spPr>
+              <a:xfrm rot="5400000">
+                <a:off x="4851731" y="613643"/>
+                <a:ext cx="616162" cy="872437"/>
+              </a:xfrm>
+              <a:prstGeom prst="rect">
+                <a:avLst/>
+              </a:prstGeom>
+              <a:noFill/>
+              <a:ln w="19050">
+                <a:noFill/>
+              </a:ln>
+            </p:spPr>
+            <p:style>
+              <a:lnRef idx="2">
+                <a:schemeClr val="accent2"/>
+              </a:lnRef>
+              <a:fillRef idx="1">
+                <a:schemeClr val="lt1"/>
+              </a:fillRef>
+              <a:effectRef idx="0">
+                <a:schemeClr val="accent2"/>
+              </a:effectRef>
+              <a:fontRef idx="minor">
+                <a:schemeClr val="dk1"/>
+              </a:fontRef>
+            </p:style>
+            <p:txBody>
+              <a:bodyPr vert="vert270" rtlCol="0" anchor="ctr"/>
+              <a:lstStyle/>
+              <a:p>
+                <a:pPr algn="ctr"/>
+                <a:r>
+                  <a:rPr lang="en-US" sz="1200" dirty="0">
+                    <a:solidFill>
+                      <a:srgbClr val="080808"/>
+                    </a:solidFill>
+                    <a:latin typeface="Segoe UI (Body)"/>
+                    <a:cs typeface="Tahoma"/>
+                  </a:rPr>
+                  <a:t>……..</a:t>
+                </a:r>
+                <a:endParaRPr lang="en-BE" sz="1200" dirty="0" err="1">
+                  <a:solidFill>
+                    <a:srgbClr val="080808"/>
+                  </a:solidFill>
+                  <a:latin typeface="Segoe UI (Body)"/>
+                  <a:cs typeface="Tahoma"/>
+                </a:endParaRPr>
+              </a:p>
+            </p:txBody>
+          </p:sp>
+        </p:grpSp>
+        <p:pic>
+          <p:nvPicPr>
+            <p:cNvPr id="136" name="Picture 135">
+              <a:extLst>
+                <a:ext uri="{FF2B5EF4-FFF2-40B4-BE49-F238E27FC236}">
+                  <a16:creationId xmlns:a16="http://schemas.microsoft.com/office/drawing/2014/main" id="{5F019165-5A39-4462-9F4B-DAB7F66A4CFD}"/>
+                </a:ext>
+              </a:extLst>
+            </p:cNvPr>
+            <p:cNvPicPr>
+              <a:picLocks noChangeAspect="1"/>
+            </p:cNvPicPr>
+            <p:nvPr/>
+          </p:nvPicPr>
+          <p:blipFill>
+            <a:blip r:embed="rId10"/>
+            <a:stretch>
+              <a:fillRect/>
+            </a:stretch>
+          </p:blipFill>
+          <p:spPr>
+            <a:xfrm>
+              <a:off x="5872663" y="1756127"/>
+              <a:ext cx="446663" cy="446663"/>
+            </a:xfrm>
+            <a:prstGeom prst="rect">
+              <a:avLst/>
+            </a:prstGeom>
+          </p:spPr>
+        </p:pic>
+        <p:cxnSp>
+          <p:nvCxnSpPr>
+            <p:cNvPr id="145" name="Connector: Elbow 144">
+              <a:extLst>
+                <a:ext uri="{FF2B5EF4-FFF2-40B4-BE49-F238E27FC236}">
+                  <a16:creationId xmlns:a16="http://schemas.microsoft.com/office/drawing/2014/main" id="{61AEB452-4A01-49DE-AFFC-9B3E5E146698}"/>
+                </a:ext>
+              </a:extLst>
+            </p:cNvPr>
+            <p:cNvCxnSpPr>
+              <a:cxnSpLocks/>
+              <a:stCxn id="26" idx="2"/>
+            </p:cNvCxnSpPr>
+            <p:nvPr/>
+          </p:nvCxnSpPr>
+          <p:spPr>
+            <a:xfrm rot="16200000" flipH="1">
+              <a:off x="5428740" y="1484384"/>
+              <a:ext cx="342573" cy="496653"/>
+            </a:xfrm>
+            <a:prstGeom prst="bentConnector2">
+              <a:avLst/>
+            </a:prstGeom>
+            <a:ln w="19050">
+              <a:solidFill>
+                <a:schemeClr val="accent1"/>
+              </a:solidFill>
+              <a:prstDash val="sysDot"/>
+              <a:tailEnd type="triangle"/>
+            </a:ln>
+          </p:spPr>
+          <p:style>
+            <a:lnRef idx="1">
+              <a:schemeClr val="accent3"/>
+            </a:lnRef>
+            <a:fillRef idx="0">
+              <a:schemeClr val="accent3"/>
+            </a:fillRef>
+            <a:effectRef idx="0">
+              <a:schemeClr val="accent3"/>
+            </a:effectRef>
+            <a:fontRef idx="minor">
+              <a:schemeClr val="tx1"/>
+            </a:fontRef>
+          </p:style>
+        </p:cxnSp>
+        <p:cxnSp>
+          <p:nvCxnSpPr>
+            <p:cNvPr id="150" name="Connector: Elbow 149">
+              <a:extLst>
+                <a:ext uri="{FF2B5EF4-FFF2-40B4-BE49-F238E27FC236}">
+                  <a16:creationId xmlns:a16="http://schemas.microsoft.com/office/drawing/2014/main" id="{4294EB57-D253-43C9-8C3C-454DBD6C3372}"/>
+                </a:ext>
+              </a:extLst>
+            </p:cNvPr>
+            <p:cNvCxnSpPr>
+              <a:cxnSpLocks/>
+              <a:stCxn id="25" idx="2"/>
+            </p:cNvCxnSpPr>
+            <p:nvPr/>
+          </p:nvCxnSpPr>
+          <p:spPr>
+            <a:xfrm rot="16200000" flipH="1">
+              <a:off x="4854783" y="1075255"/>
+              <a:ext cx="512110" cy="1475029"/>
+            </a:xfrm>
+            <a:prstGeom prst="bentConnector2">
+              <a:avLst/>
+            </a:prstGeom>
+            <a:ln w="19050">
+              <a:solidFill>
+                <a:schemeClr val="accent1"/>
+              </a:solidFill>
+              <a:prstDash val="sysDot"/>
+              <a:tailEnd type="triangle"/>
+            </a:ln>
+          </p:spPr>
+          <p:style>
+            <a:lnRef idx="1">
+              <a:schemeClr val="accent3"/>
+            </a:lnRef>
+            <a:fillRef idx="0">
+              <a:schemeClr val="accent3"/>
+            </a:fillRef>
+            <a:effectRef idx="0">
+              <a:schemeClr val="accent3"/>
+            </a:effectRef>
+            <a:fontRef idx="minor">
+              <a:schemeClr val="tx1"/>
+            </a:fontRef>
+          </p:style>
+        </p:cxnSp>
+        <p:cxnSp>
+          <p:nvCxnSpPr>
+            <p:cNvPr id="153" name="Connector: Elbow 152">
+              <a:extLst>
+                <a:ext uri="{FF2B5EF4-FFF2-40B4-BE49-F238E27FC236}">
+                  <a16:creationId xmlns:a16="http://schemas.microsoft.com/office/drawing/2014/main" id="{44A029BF-F4D3-489C-9C28-36A7E7C69A53}"/>
+                </a:ext>
+              </a:extLst>
+            </p:cNvPr>
+            <p:cNvCxnSpPr>
+              <a:cxnSpLocks/>
+              <a:stCxn id="31" idx="2"/>
+            </p:cNvCxnSpPr>
+            <p:nvPr/>
+          </p:nvCxnSpPr>
+          <p:spPr>
+            <a:xfrm rot="5400000">
+              <a:off x="6829361" y="1079511"/>
+              <a:ext cx="503599" cy="1475029"/>
+            </a:xfrm>
+            <a:prstGeom prst="bentConnector2">
+              <a:avLst/>
+            </a:prstGeom>
+            <a:ln w="19050">
+              <a:solidFill>
+                <a:schemeClr val="accent1"/>
+              </a:solidFill>
+              <a:prstDash val="sysDot"/>
+              <a:tailEnd type="triangle"/>
+            </a:ln>
+          </p:spPr>
+          <p:style>
+            <a:lnRef idx="1">
+              <a:schemeClr val="accent3"/>
+            </a:lnRef>
+            <a:fillRef idx="0">
+              <a:schemeClr val="accent3"/>
+            </a:fillRef>
+            <a:effectRef idx="0">
+              <a:schemeClr val="accent3"/>
+            </a:effectRef>
+            <a:fontRef idx="minor">
+              <a:schemeClr val="tx1"/>
+            </a:fontRef>
+          </p:style>
+        </p:cxnSp>
+        <p:cxnSp>
+          <p:nvCxnSpPr>
+            <p:cNvPr id="159" name="Connector: Elbow 158">
+              <a:extLst>
+                <a:ext uri="{FF2B5EF4-FFF2-40B4-BE49-F238E27FC236}">
+                  <a16:creationId xmlns:a16="http://schemas.microsoft.com/office/drawing/2014/main" id="{BE73164F-0C2D-4A0C-971C-F9AC4C4DD39C}"/>
+                </a:ext>
+              </a:extLst>
+            </p:cNvPr>
+            <p:cNvCxnSpPr>
+              <a:cxnSpLocks/>
+              <a:stCxn id="30" idx="2"/>
+            </p:cNvCxnSpPr>
+            <p:nvPr/>
+          </p:nvCxnSpPr>
+          <p:spPr>
+            <a:xfrm rot="5400000">
+              <a:off x="6431287" y="1477586"/>
+              <a:ext cx="321370" cy="496652"/>
+            </a:xfrm>
+            <a:prstGeom prst="bentConnector2">
+              <a:avLst/>
+            </a:prstGeom>
+            <a:ln w="19050">
+              <a:solidFill>
+                <a:schemeClr val="accent1"/>
+              </a:solidFill>
+              <a:prstDash val="sysDot"/>
+              <a:tailEnd type="triangle"/>
+            </a:ln>
+          </p:spPr>
+          <p:style>
+            <a:lnRef idx="1">
+              <a:schemeClr val="accent3"/>
+            </a:lnRef>
+            <a:fillRef idx="0">
+              <a:schemeClr val="accent3"/>
+            </a:fillRef>
+            <a:effectRef idx="0">
+              <a:schemeClr val="accent3"/>
+            </a:effectRef>
+            <a:fontRef idx="minor">
+              <a:schemeClr val="tx1"/>
+            </a:fontRef>
+          </p:style>
+        </p:cxnSp>
+        <p:pic>
+          <p:nvPicPr>
+            <p:cNvPr id="17" name="Picture 16">
+              <a:extLst>
+                <a:ext uri="{FF2B5EF4-FFF2-40B4-BE49-F238E27FC236}">
+                  <a16:creationId xmlns:a16="http://schemas.microsoft.com/office/drawing/2014/main" id="{B98D6CD7-1B90-4F78-8D17-5CA3879D5907}"/>
+                </a:ext>
+              </a:extLst>
+            </p:cNvPr>
+            <p:cNvPicPr>
+              <a:picLocks noChangeAspect="1"/>
+            </p:cNvPicPr>
+            <p:nvPr/>
+          </p:nvPicPr>
+          <p:blipFill>
+            <a:blip r:embed="rId11"/>
+            <a:stretch>
+              <a:fillRect/>
+            </a:stretch>
+          </p:blipFill>
+          <p:spPr>
+            <a:xfrm>
+              <a:off x="5791921" y="426766"/>
+              <a:ext cx="600620" cy="600620"/>
+            </a:xfrm>
+            <a:prstGeom prst="rect">
+              <a:avLst/>
+            </a:prstGeom>
+          </p:spPr>
+        </p:pic>
+        <p:cxnSp>
+          <p:nvCxnSpPr>
+            <p:cNvPr id="70" name="Connector: Elbow 69">
+              <a:extLst>
+                <a:ext uri="{FF2B5EF4-FFF2-40B4-BE49-F238E27FC236}">
+                  <a16:creationId xmlns:a16="http://schemas.microsoft.com/office/drawing/2014/main" id="{22635DB3-EE01-41A6-8187-BDF938E65A54}"/>
+                </a:ext>
+              </a:extLst>
+            </p:cNvPr>
+            <p:cNvCxnSpPr>
+              <a:cxnSpLocks/>
+              <a:stCxn id="17" idx="3"/>
+              <a:endCxn id="31" idx="0"/>
+            </p:cNvCxnSpPr>
+            <p:nvPr/>
+          </p:nvCxnSpPr>
+          <p:spPr>
+            <a:xfrm>
+              <a:off x="6392541" y="727076"/>
+              <a:ext cx="1426133" cy="221987"/>
+            </a:xfrm>
+            <a:prstGeom prst="bentConnector2">
+              <a:avLst/>
+            </a:prstGeom>
+            <a:ln w="19050">
+              <a:solidFill>
+                <a:schemeClr val="accent1"/>
+              </a:solidFill>
+              <a:prstDash val="solid"/>
+              <a:tailEnd type="triangle"/>
+            </a:ln>
+          </p:spPr>
+          <p:style>
+            <a:lnRef idx="1">
+              <a:schemeClr val="accent3"/>
+            </a:lnRef>
+            <a:fillRef idx="0">
+              <a:schemeClr val="accent3"/>
+            </a:fillRef>
+            <a:effectRef idx="0">
+              <a:schemeClr val="accent3"/>
+            </a:effectRef>
+            <a:fontRef idx="minor">
+              <a:schemeClr val="tx1"/>
+            </a:fontRef>
+          </p:style>
+        </p:cxnSp>
+        <p:cxnSp>
+          <p:nvCxnSpPr>
+            <p:cNvPr id="74" name="Connector: Elbow 73">
+              <a:extLst>
+                <a:ext uri="{FF2B5EF4-FFF2-40B4-BE49-F238E27FC236}">
+                  <a16:creationId xmlns:a16="http://schemas.microsoft.com/office/drawing/2014/main" id="{7682DBFF-A857-4D16-8335-42ED71A21756}"/>
+                </a:ext>
+              </a:extLst>
+            </p:cNvPr>
+            <p:cNvCxnSpPr>
+              <a:cxnSpLocks/>
+              <a:stCxn id="17" idx="3"/>
+              <a:endCxn id="30" idx="0"/>
+            </p:cNvCxnSpPr>
+            <p:nvPr/>
+          </p:nvCxnSpPr>
+          <p:spPr>
+            <a:xfrm>
+              <a:off x="6392541" y="727076"/>
+              <a:ext cx="447757" cy="221988"/>
+            </a:xfrm>
+            <a:prstGeom prst="bentConnector2">
+              <a:avLst/>
+            </a:prstGeom>
+            <a:ln w="19050">
+              <a:solidFill>
+                <a:schemeClr val="accent1"/>
+              </a:solidFill>
+              <a:prstDash val="solid"/>
+              <a:tailEnd type="triangle"/>
+            </a:ln>
+          </p:spPr>
+          <p:style>
+            <a:lnRef idx="1">
+              <a:schemeClr val="accent3"/>
+            </a:lnRef>
+            <a:fillRef idx="0">
+              <a:schemeClr val="accent3"/>
+            </a:fillRef>
+            <a:effectRef idx="0">
+              <a:schemeClr val="accent3"/>
+            </a:effectRef>
+            <a:fontRef idx="minor">
+              <a:schemeClr val="tx1"/>
+            </a:fontRef>
+          </p:style>
+        </p:cxnSp>
+        <p:cxnSp>
+          <p:nvCxnSpPr>
+            <p:cNvPr id="77" name="Connector: Elbow 76">
+              <a:extLst>
+                <a:ext uri="{FF2B5EF4-FFF2-40B4-BE49-F238E27FC236}">
+                  <a16:creationId xmlns:a16="http://schemas.microsoft.com/office/drawing/2014/main" id="{6740CF15-7313-49FF-A3F2-8781D68A4552}"/>
+                </a:ext>
+              </a:extLst>
+            </p:cNvPr>
+            <p:cNvCxnSpPr>
+              <a:cxnSpLocks/>
+              <a:stCxn id="17" idx="1"/>
+              <a:endCxn id="26" idx="0"/>
+            </p:cNvCxnSpPr>
+            <p:nvPr/>
+          </p:nvCxnSpPr>
+          <p:spPr>
+            <a:xfrm rot="10800000" flipV="1">
+              <a:off x="5351701" y="727076"/>
+              <a:ext cx="440221" cy="218186"/>
+            </a:xfrm>
+            <a:prstGeom prst="bentConnector2">
+              <a:avLst/>
+            </a:prstGeom>
+            <a:ln w="19050">
+              <a:solidFill>
+                <a:schemeClr val="accent1"/>
+              </a:solidFill>
+              <a:prstDash val="solid"/>
+              <a:tailEnd type="triangle"/>
+            </a:ln>
+          </p:spPr>
+          <p:style>
+            <a:lnRef idx="1">
+              <a:schemeClr val="accent3"/>
+            </a:lnRef>
+            <a:fillRef idx="0">
+              <a:schemeClr val="accent3"/>
+            </a:fillRef>
+            <a:effectRef idx="0">
+              <a:schemeClr val="accent3"/>
+            </a:effectRef>
+            <a:fontRef idx="minor">
+              <a:schemeClr val="tx1"/>
+            </a:fontRef>
+          </p:style>
+        </p:cxnSp>
+        <p:cxnSp>
+          <p:nvCxnSpPr>
+            <p:cNvPr id="80" name="Connector: Elbow 79">
+              <a:extLst>
+                <a:ext uri="{FF2B5EF4-FFF2-40B4-BE49-F238E27FC236}">
+                  <a16:creationId xmlns:a16="http://schemas.microsoft.com/office/drawing/2014/main" id="{B12664EB-CF16-4E82-A91A-22FC638738F7}"/>
+                </a:ext>
+              </a:extLst>
+            </p:cNvPr>
+            <p:cNvCxnSpPr>
+              <a:cxnSpLocks/>
+              <a:stCxn id="17" idx="1"/>
+              <a:endCxn id="25" idx="0"/>
+            </p:cNvCxnSpPr>
+            <p:nvPr/>
+          </p:nvCxnSpPr>
+          <p:spPr>
+            <a:xfrm rot="10800000" flipV="1">
+              <a:off x="4373325" y="727076"/>
+              <a:ext cx="1418597" cy="213476"/>
+            </a:xfrm>
+            <a:prstGeom prst="bentConnector2">
+              <a:avLst/>
+            </a:prstGeom>
+            <a:ln w="19050">
+              <a:solidFill>
+                <a:schemeClr val="accent1"/>
+              </a:solidFill>
+              <a:prstDash val="solid"/>
+              <a:tailEnd type="triangle"/>
+            </a:ln>
+          </p:spPr>
+          <p:style>
+            <a:lnRef idx="1">
+              <a:schemeClr val="accent3"/>
+            </a:lnRef>
+            <a:fillRef idx="0">
+              <a:schemeClr val="accent3"/>
+            </a:fillRef>
+            <a:effectRef idx="0">
+              <a:schemeClr val="accent3"/>
+            </a:effectRef>
+            <a:fontRef idx="minor">
+              <a:schemeClr val="tx1"/>
+            </a:fontRef>
+          </p:style>
+        </p:cxnSp>
+      </p:grpSp>
+      <p:sp>
+        <p:nvSpPr>
+          <p:cNvPr id="39" name="Oval 38">
+            <a:extLst>
+              <a:ext uri="{FF2B5EF4-FFF2-40B4-BE49-F238E27FC236}">
+                <a16:creationId xmlns:a16="http://schemas.microsoft.com/office/drawing/2014/main" id="{C2DD5394-0E51-4EA4-9850-C1A444DE83DF}"/>
+              </a:ext>
+            </a:extLst>
+          </p:cNvPr>
+          <p:cNvSpPr/>
+          <p:nvPr/>
+        </p:nvSpPr>
+        <p:spPr>
+          <a:xfrm>
+            <a:off x="6003563" y="3104707"/>
+            <a:ext cx="202242" cy="194557"/>
+          </a:xfrm>
+          <a:prstGeom prst="ellipse">
+            <a:avLst/>
+          </a:prstGeom>
+          <a:ln w="12700"/>
+        </p:spPr>
+        <p:style>
+          <a:lnRef idx="2">
+            <a:schemeClr val="dk1"/>
+          </a:lnRef>
+          <a:fillRef idx="1">
+            <a:schemeClr val="lt1"/>
+          </a:fillRef>
+          <a:effectRef idx="0">
+            <a:schemeClr val="dk1"/>
+          </a:effectRef>
+          <a:fontRef idx="minor">
+            <a:schemeClr val="dk1"/>
+          </a:fontRef>
+        </p:style>
+        <p:txBody>
+          <a:bodyPr rtlCol="0" anchor="ctr"/>
+          <a:lstStyle/>
+          <a:p>
+            <a:pPr algn="ctr"/>
+            <a:r>
+              <a:rPr lang="en-US" sz="1400" dirty="0">
+                <a:solidFill>
+                  <a:srgbClr val="080808"/>
+                </a:solidFill>
+                <a:cs typeface="Tahoma"/>
+              </a:rPr>
+              <a:t>1</a:t>
+            </a:r>
+            <a:endParaRPr lang="LID4096" sz="1400" dirty="0" err="1">
+              <a:solidFill>
+                <a:srgbClr val="080808"/>
+              </a:solidFill>
+              <a:cs typeface="Tahoma"/>
+            </a:endParaRPr>
+          </a:p>
+        </p:txBody>
+      </p:sp>
+      <p:sp>
+        <p:nvSpPr>
+          <p:cNvPr id="43" name="Oval 42">
+            <a:extLst>
+              <a:ext uri="{FF2B5EF4-FFF2-40B4-BE49-F238E27FC236}">
+                <a16:creationId xmlns:a16="http://schemas.microsoft.com/office/drawing/2014/main" id="{919D2FB1-190A-4BD5-BEC3-F2B3A3415CAF}"/>
+              </a:ext>
+            </a:extLst>
+          </p:cNvPr>
+          <p:cNvSpPr/>
+          <p:nvPr/>
+        </p:nvSpPr>
+        <p:spPr>
+          <a:xfrm>
+            <a:off x="5994873" y="4439989"/>
+            <a:ext cx="202242" cy="194557"/>
+          </a:xfrm>
+          <a:prstGeom prst="ellipse">
+            <a:avLst/>
+          </a:prstGeom>
+          <a:ln w="12700"/>
+        </p:spPr>
+        <p:style>
+          <a:lnRef idx="2">
+            <a:schemeClr val="dk1"/>
+          </a:lnRef>
+          <a:fillRef idx="1">
+            <a:schemeClr val="lt1"/>
+          </a:fillRef>
+          <a:effectRef idx="0">
+            <a:schemeClr val="dk1"/>
+          </a:effectRef>
+          <a:fontRef idx="minor">
+            <a:schemeClr val="dk1"/>
+          </a:fontRef>
+        </p:style>
+        <p:txBody>
+          <a:bodyPr rtlCol="0" anchor="ctr"/>
+          <a:lstStyle/>
+          <a:p>
+            <a:pPr algn="ctr"/>
+            <a:r>
+              <a:rPr lang="en-US" sz="1400" dirty="0">
+                <a:solidFill>
+                  <a:srgbClr val="080808"/>
+                </a:solidFill>
+                <a:cs typeface="Tahoma"/>
+              </a:rPr>
+              <a:t>2</a:t>
+            </a:r>
+            <a:endParaRPr lang="LID4096" sz="1400" dirty="0" err="1">
+              <a:solidFill>
+                <a:srgbClr val="080808"/>
+              </a:solidFill>
+              <a:cs typeface="Tahoma"/>
+            </a:endParaRPr>
+          </a:p>
+        </p:txBody>
+      </p:sp>
+      <p:sp>
+        <p:nvSpPr>
+          <p:cNvPr id="44" name="Oval 43">
+            <a:extLst>
+              <a:ext uri="{FF2B5EF4-FFF2-40B4-BE49-F238E27FC236}">
+                <a16:creationId xmlns:a16="http://schemas.microsoft.com/office/drawing/2014/main" id="{52D19C66-EED4-4C79-95C0-1EC3EBBD84A7}"/>
+              </a:ext>
+            </a:extLst>
+          </p:cNvPr>
+          <p:cNvSpPr/>
+          <p:nvPr/>
+        </p:nvSpPr>
+        <p:spPr>
+          <a:xfrm>
+            <a:off x="9768518" y="5140684"/>
+            <a:ext cx="202242" cy="194557"/>
+          </a:xfrm>
+          <a:prstGeom prst="ellipse">
+            <a:avLst/>
+          </a:prstGeom>
+          <a:ln w="12700"/>
+        </p:spPr>
+        <p:style>
+          <a:lnRef idx="2">
+            <a:schemeClr val="dk1"/>
+          </a:lnRef>
+          <a:fillRef idx="1">
+            <a:schemeClr val="lt1"/>
+          </a:fillRef>
+          <a:effectRef idx="0">
+            <a:schemeClr val="dk1"/>
+          </a:effectRef>
+          <a:fontRef idx="minor">
+            <a:schemeClr val="dk1"/>
+          </a:fontRef>
+        </p:style>
+        <p:txBody>
+          <a:bodyPr rtlCol="0" anchor="ctr"/>
+          <a:lstStyle/>
+          <a:p>
+            <a:pPr algn="ctr"/>
+            <a:r>
+              <a:rPr lang="en-US" sz="1400" dirty="0">
+                <a:solidFill>
+                  <a:srgbClr val="080808"/>
+                </a:solidFill>
+                <a:cs typeface="Tahoma"/>
+              </a:rPr>
+              <a:t>3</a:t>
+            </a:r>
+            <a:endParaRPr lang="LID4096" sz="1400" dirty="0" err="1">
+              <a:solidFill>
+                <a:srgbClr val="080808"/>
+              </a:solidFill>
+              <a:cs typeface="Tahoma"/>
+            </a:endParaRPr>
+          </a:p>
+        </p:txBody>
+      </p:sp>
+      <p:sp>
+        <p:nvSpPr>
+          <p:cNvPr id="45" name="Oval 44">
+            <a:extLst>
+              <a:ext uri="{FF2B5EF4-FFF2-40B4-BE49-F238E27FC236}">
+                <a16:creationId xmlns:a16="http://schemas.microsoft.com/office/drawing/2014/main" id="{9604885A-B68A-48BB-8898-CD5C96CF5ADC}"/>
+              </a:ext>
+            </a:extLst>
+          </p:cNvPr>
+          <p:cNvSpPr/>
+          <p:nvPr/>
+        </p:nvSpPr>
+        <p:spPr>
+          <a:xfrm>
+            <a:off x="3525150" y="5061175"/>
+            <a:ext cx="202242" cy="194557"/>
+          </a:xfrm>
+          <a:prstGeom prst="ellipse">
+            <a:avLst/>
+          </a:prstGeom>
+          <a:ln w="12700"/>
+        </p:spPr>
+        <p:style>
+          <a:lnRef idx="2">
+            <a:schemeClr val="dk1"/>
+          </a:lnRef>
+          <a:fillRef idx="1">
+            <a:schemeClr val="lt1"/>
+          </a:fillRef>
+          <a:effectRef idx="0">
+            <a:schemeClr val="dk1"/>
+          </a:effectRef>
+          <a:fontRef idx="minor">
+            <a:schemeClr val="dk1"/>
+          </a:fontRef>
+        </p:style>
+        <p:txBody>
+          <a:bodyPr rtlCol="0" anchor="ctr"/>
+          <a:lstStyle/>
+          <a:p>
+            <a:pPr algn="ctr"/>
+            <a:r>
+              <a:rPr lang="en-US" sz="1400" dirty="0">
+                <a:solidFill>
+                  <a:srgbClr val="080808"/>
+                </a:solidFill>
+                <a:cs typeface="Tahoma"/>
+              </a:rPr>
+              <a:t>4</a:t>
+            </a:r>
+            <a:endParaRPr lang="LID4096" sz="1400" dirty="0" err="1">
+              <a:solidFill>
+                <a:srgbClr val="080808"/>
+              </a:solidFill>
+              <a:cs typeface="Tahoma"/>
+            </a:endParaRPr>
+          </a:p>
+        </p:txBody>
+      </p:sp>
+      <p:sp>
+        <p:nvSpPr>
+          <p:cNvPr id="46" name="Oval 45">
+            <a:extLst>
+              <a:ext uri="{FF2B5EF4-FFF2-40B4-BE49-F238E27FC236}">
+                <a16:creationId xmlns:a16="http://schemas.microsoft.com/office/drawing/2014/main" id="{1C46153B-1E86-43AE-890A-B25987E43972}"/>
+              </a:ext>
+            </a:extLst>
+          </p:cNvPr>
+          <p:cNvSpPr/>
+          <p:nvPr/>
+        </p:nvSpPr>
+        <p:spPr>
+          <a:xfrm>
+            <a:off x="988757" y="3495997"/>
+            <a:ext cx="202242" cy="194557"/>
+          </a:xfrm>
+          <a:prstGeom prst="ellipse">
+            <a:avLst/>
+          </a:prstGeom>
+          <a:ln w="12700"/>
+        </p:spPr>
+        <p:style>
+          <a:lnRef idx="2">
+            <a:schemeClr val="dk1"/>
+          </a:lnRef>
+          <a:fillRef idx="1">
+            <a:schemeClr val="lt1"/>
+          </a:fillRef>
+          <a:effectRef idx="0">
+            <a:schemeClr val="dk1"/>
+          </a:effectRef>
+          <a:fontRef idx="minor">
+            <a:schemeClr val="dk1"/>
+          </a:fontRef>
+        </p:style>
+        <p:txBody>
+          <a:bodyPr rtlCol="0" anchor="ctr"/>
+          <a:lstStyle/>
+          <a:p>
+            <a:pPr algn="ctr"/>
+            <a:r>
+              <a:rPr lang="en-US" sz="1400" dirty="0">
+                <a:solidFill>
+                  <a:srgbClr val="080808"/>
+                </a:solidFill>
+                <a:cs typeface="Tahoma"/>
+              </a:rPr>
+              <a:t>5</a:t>
+            </a:r>
+            <a:endParaRPr lang="LID4096" sz="1400" dirty="0" err="1">
+              <a:solidFill>
+                <a:srgbClr val="080808"/>
+              </a:solidFill>
               <a:cs typeface="Tahoma"/>
             </a:endParaRPr>
           </a:p>
@@ -29052,6 +29565,44 @@
 </file>
 
 <file path=customXml/item1.xml><?xml version="1.0" encoding="utf-8"?>
+<p:properties xmlns:p="http://schemas.microsoft.com/office/2006/metadata/properties" xmlns:xsi="http://www.w3.org/2001/XMLSchema-instance" xmlns:pc="http://schemas.microsoft.com/office/infopath/2007/PartnerControls">
+  <documentManagement>
+    <SharedWithUsers xmlns="fee67b93-6974-4599-bd16-a295bb27cfe1">
+      <UserInfo>
+        <DisplayName>Stijn Degrieck</DisplayName>
+        <AccountId>13</AccountId>
+        <AccountType/>
+      </UserInfo>
+      <UserInfo>
+        <DisplayName>Henk Buysschaert</DisplayName>
+        <AccountId>73</AccountId>
+        <AccountType/>
+      </UserInfo>
+      <UserInfo>
+        <DisplayName>Sean MacGillavry</DisplayName>
+        <AccountId>69</AccountId>
+        <AccountType/>
+      </UserInfo>
+      <UserInfo>
+        <DisplayName>Joachim De Roissart</DisplayName>
+        <AccountId>90</AccountId>
+        <AccountType/>
+      </UserInfo>
+    </SharedWithUsers>
+  </documentManagement>
+</p:properties>
+</file>
+
+<file path=customXml/item2.xml><?xml version="1.0" encoding="utf-8"?>
+<?mso-contentType ?>
+<FormTemplates xmlns="http://schemas.microsoft.com/sharepoint/v3/contenttype/forms">
+  <Display>DocumentLibraryForm</Display>
+  <Edit>DocumentLibraryForm</Edit>
+  <New>DocumentLibraryForm</New>
+</FormTemplates>
+</file>
+
+<file path=customXml/item3.xml><?xml version="1.0" encoding="utf-8"?>
 <ct:contentTypeSchema xmlns:ct="http://schemas.microsoft.com/office/2006/metadata/contentType" xmlns:ma="http://schemas.microsoft.com/office/2006/metadata/properties/metaAttributes" ct:_="" ma:_="" ma:contentTypeName="Document" ma:contentTypeID="0x010100BAB604DF092D3D49B351D6278F007E19" ma:contentTypeVersion="7" ma:contentTypeDescription="Create a new document." ma:contentTypeScope="" ma:versionID="a741f742da3336562cd50a39a69eaa15">
   <xsd:schema xmlns:xsd="http://www.w3.org/2001/XMLSchema" xmlns:xs="http://www.w3.org/2001/XMLSchema" xmlns:p="http://schemas.microsoft.com/office/2006/metadata/properties" xmlns:ns2="fee67b93-6974-4599-bd16-a295bb27cfe1" xmlns:ns3="ca5330bd-c563-4e65-982c-c703f4b94ec3" targetNamespace="http://schemas.microsoft.com/office/2006/metadata/properties" ma:root="true" ma:fieldsID="38f3fb98fb601c9cb6e194579c7111d9" ns2:_="" ns3:_="">
     <xsd:import namespace="fee67b93-6974-4599-bd16-a295bb27cfe1"/>
@@ -29236,45 +29787,32 @@
 </ct:contentTypeSchema>
 </file>
 
-<file path=customXml/item2.xml><?xml version="1.0" encoding="utf-8"?>
-<?mso-contentType ?>
-<FormTemplates xmlns="http://schemas.microsoft.com/sharepoint/v3/contenttype/forms">
-  <Display>DocumentLibraryForm</Display>
-  <Edit>DocumentLibraryForm</Edit>
-  <New>DocumentLibraryForm</New>
-</FormTemplates>
+<file path=customXml/itemProps1.xml><?xml version="1.0" encoding="utf-8"?>
+<ds:datastoreItem xmlns:ds="http://schemas.openxmlformats.org/officeDocument/2006/customXml" ds:itemID="{BB868E38-3883-485C-AA72-FE197350C91A}">
+  <ds:schemaRefs>
+    <ds:schemaRef ds:uri="http://purl.org/dc/dcmitype/"/>
+    <ds:schemaRef ds:uri="http://purl.org/dc/elements/1.1/"/>
+    <ds:schemaRef ds:uri="http://schemas.openxmlformats.org/package/2006/metadata/core-properties"/>
+    <ds:schemaRef ds:uri="http://purl.org/dc/terms/"/>
+    <ds:schemaRef ds:uri="http://schemas.microsoft.com/office/2006/documentManagement/types"/>
+    <ds:schemaRef ds:uri="http://www.w3.org/XML/1998/namespace"/>
+    <ds:schemaRef ds:uri="http://schemas.microsoft.com/office/infopath/2007/PartnerControls"/>
+    <ds:schemaRef ds:uri="ca5330bd-c563-4e65-982c-c703f4b94ec3"/>
+    <ds:schemaRef ds:uri="fee67b93-6974-4599-bd16-a295bb27cfe1"/>
+    <ds:schemaRef ds:uri="http://schemas.microsoft.com/office/2006/metadata/properties"/>
+  </ds:schemaRefs>
+</ds:datastoreItem>
 </file>
 
-<file path=customXml/item3.xml><?xml version="1.0" encoding="utf-8"?>
-<p:properties xmlns:p="http://schemas.microsoft.com/office/2006/metadata/properties" xmlns:xsi="http://www.w3.org/2001/XMLSchema-instance" xmlns:pc="http://schemas.microsoft.com/office/infopath/2007/PartnerControls">
-  <documentManagement>
-    <SharedWithUsers xmlns="fee67b93-6974-4599-bd16-a295bb27cfe1">
-      <UserInfo>
-        <DisplayName>Stijn Degrieck</DisplayName>
-        <AccountId>13</AccountId>
-        <AccountType/>
-      </UserInfo>
-      <UserInfo>
-        <DisplayName>Henk Buysschaert</DisplayName>
-        <AccountId>73</AccountId>
-        <AccountType/>
-      </UserInfo>
-      <UserInfo>
-        <DisplayName>Sean MacGillavry</DisplayName>
-        <AccountId>69</AccountId>
-        <AccountType/>
-      </UserInfo>
-      <UserInfo>
-        <DisplayName>Joachim De Roissart</DisplayName>
-        <AccountId>90</AccountId>
-        <AccountType/>
-      </UserInfo>
-    </SharedWithUsers>
-  </documentManagement>
-</p:properties>
+<file path=customXml/itemProps2.xml><?xml version="1.0" encoding="utf-8"?>
+<ds:datastoreItem xmlns:ds="http://schemas.openxmlformats.org/officeDocument/2006/customXml" ds:itemID="{BD1960A6-4BE3-42B6-BC04-74E06DF22BF7}">
+  <ds:schemaRefs>
+    <ds:schemaRef ds:uri="http://schemas.microsoft.com/sharepoint/v3/contenttype/forms"/>
+  </ds:schemaRefs>
+</ds:datastoreItem>
 </file>
 
-<file path=customXml/itemProps1.xml><?xml version="1.0" encoding="utf-8"?>
+<file path=customXml/itemProps3.xml><?xml version="1.0" encoding="utf-8"?>
 <ds:datastoreItem xmlns:ds="http://schemas.openxmlformats.org/officeDocument/2006/customXml" ds:itemID="{B84ED37A-3E41-4079-B161-B36C644DBC25}">
   <ds:schemaRefs>
     <ds:schemaRef ds:uri="http://schemas.microsoft.com/office/2006/metadata/contentType"/>
@@ -29291,29 +29829,4 @@
     <ds:schemaRef ds:uri="http://schemas.microsoft.com/internal/obd"/>
   </ds:schemaRefs>
 </ds:datastoreItem>
-</file>
-
-<file path=customXml/itemProps2.xml><?xml version="1.0" encoding="utf-8"?>
-<ds:datastoreItem xmlns:ds="http://schemas.openxmlformats.org/officeDocument/2006/customXml" ds:itemID="{BD1960A6-4BE3-42B6-BC04-74E06DF22BF7}">
-  <ds:schemaRefs>
-    <ds:schemaRef ds:uri="http://schemas.microsoft.com/sharepoint/v3/contenttype/forms"/>
-  </ds:schemaRefs>
-</ds:datastoreItem>
-</file>
-
-<file path=customXml/itemProps3.xml><?xml version="1.0" encoding="utf-8"?>
-<ds:datastoreItem xmlns:ds="http://schemas.openxmlformats.org/officeDocument/2006/customXml" ds:itemID="{BB868E38-3883-485C-AA72-FE197350C91A}">
-  <ds:schemaRefs>
-    <ds:schemaRef ds:uri="http://purl.org/dc/dcmitype/"/>
-    <ds:schemaRef ds:uri="http://purl.org/dc/elements/1.1/"/>
-    <ds:schemaRef ds:uri="http://schemas.openxmlformats.org/package/2006/metadata/core-properties"/>
-    <ds:schemaRef ds:uri="http://purl.org/dc/terms/"/>
-    <ds:schemaRef ds:uri="http://schemas.microsoft.com/office/2006/documentManagement/types"/>
-    <ds:schemaRef ds:uri="http://www.w3.org/XML/1998/namespace"/>
-    <ds:schemaRef ds:uri="http://schemas.microsoft.com/office/infopath/2007/PartnerControls"/>
-    <ds:schemaRef ds:uri="ca5330bd-c563-4e65-982c-c703f4b94ec3"/>
-    <ds:schemaRef ds:uri="fee67b93-6974-4599-bd16-a295bb27cfe1"/>
-    <ds:schemaRef ds:uri="http://schemas.microsoft.com/office/2006/metadata/properties"/>
-  </ds:schemaRefs>
-</ds:datastoreItem>
 </file>
</xml_diff>